<commit_message>
Uploading Capstone 3 project files
</commit_message>
<xml_diff>
--- a/Capstone 3 - Project Proposal.pptx
+++ b/Capstone 3 - Project Proposal.pptx
@@ -4809,12 +4809,9 @@
           <a:lstStyle/>
           <a:p>
             <a:r>
-              <a:rPr lang="en-US" sz="1100" dirty="0"/>
-              <a:t>Social media produces massive amounts of messy, unstructured text and engagement data. Organizations need a structured way to extract insights about sentiment, trends, and future engagement. This project will build a Python‑based system that ingests social media data, analyzes sentiment and trending topics, and uses NLP, EDA, and time‑series modeling to forecast engagement over time.</a:t>
+              <a:rPr lang="en-US" sz="1200" dirty="0"/>
+              <a:t>Airlines face a constant flood of social media messages, but without automated sentiment analysis, they struggle to track customer mood or spot rising complaints in real time. Manual monitoring is too slow and inconsistent, causing delayed responses and missed chances to improve customer experience.</a:t>
             </a:r>
-          </a:p>
-          <a:p>
-            <a:endParaRPr lang="en-US" sz="1100" dirty="0"/>
           </a:p>
           <a:p>
             <a:pPr marL="0" marR="0" lvl="0" indent="0" algn="l" rtl="0">
@@ -4860,8 +4857,8 @@
           <a:p>
             <a:pPr lvl="0"/>
             <a:r>
-              <a:rPr lang="en-US" sz="1100" dirty="0"/>
-              <a:t>Built system analyzes sentiment and trending topics, and forecasts future engagement over time.</a:t>
+              <a:rPr lang="en-US" sz="1200" dirty="0"/>
+              <a:t>Built system analyzes customer sentiment and trending topics, and forecasts future engagement over time.</a:t>
             </a:r>
           </a:p>
         </p:txBody>
@@ -4893,8 +4890,8 @@
           <a:p>
             <a:pPr lvl="0"/>
             <a:r>
-              <a:rPr lang="en-US" sz="1100" dirty="0"/>
-              <a:t>Build a system capable of analyzing sentiment, identifying trends, and forecasting engagement using real social media data and produce insights with real‑world value.</a:t>
+              <a:rPr lang="en-US" sz="1200" dirty="0"/>
+              <a:t>Build a system capable of analyzing customer sentiment, identifying trends, and forecasting engagement using real social media data and produce insights with real‑world value.</a:t>
             </a:r>
           </a:p>
         </p:txBody>
@@ -4929,8 +4926,8 @@
               <a:buChar char="•"/>
             </a:pPr>
             <a:r>
-              <a:rPr lang="en-US" sz="1100" dirty="0"/>
-              <a:t>Data set has lot of messy data to work with in multiple files.</a:t>
+              <a:rPr lang="en-US" sz="1200" dirty="0"/>
+              <a:t>Data set has lot of messy data to work with.</a:t>
             </a:r>
           </a:p>
         </p:txBody>
@@ -4960,32 +4957,18 @@
           </a:bodyPr>
           <a:lstStyle/>
           <a:p>
-            <a:pPr marL="285750" indent="-285750">
-              <a:buFont typeface="Arial" panose="020B0604020202020204" pitchFamily="34" charset="0"/>
-              <a:buChar char="•"/>
-            </a:pPr>
             <a:r>
-              <a:rPr lang="en-US" sz="1100" dirty="0" err="1"/>
-              <a:t>luminati</a:t>
+              <a:rPr lang="en-US" u="sng" dirty="0">
+                <a:hlinkClick r:id="rId3"/>
+              </a:rPr>
+              <a:t>Twitter US Airline Sentiment</a:t>
             </a:r>
+            <a:endParaRPr lang="en-US" dirty="0"/>
+          </a:p>
+          <a:p>
             <a:r>
-              <a:rPr lang="en-US" sz="1100" dirty="0"/>
-              <a:t>-io / Social-media-dataset-samples</a:t>
-            </a:r>
-            <a:br>
-              <a:rPr lang="en-US" sz="1100" dirty="0"/>
-            </a:br>
-            <a:r>
-              <a:rPr lang="en-US" sz="1100" dirty="0"/>
-              <a:t>A multi‑platform collection of social media datasets, each containing </a:t>
-            </a:r>
-            <a:r>
-              <a:rPr lang="en-US" sz="1100" b="1" dirty="0"/>
-              <a:t>1,000+ records</a:t>
-            </a:r>
-            <a:r>
-              <a:rPr lang="en-US" sz="1100" dirty="0"/>
-              <a:t>.</a:t>
+              <a:rPr lang="en-US" dirty="0"/>
+              <a:t>15 columns, more than 14000 tweets</a:t>
             </a:r>
           </a:p>
           <a:p>
@@ -5584,7 +5567,7 @@
               <a:buChar char="•"/>
             </a:pPr>
             <a:r>
-              <a:rPr lang="en-US" sz="1100" b="0" i="0" u="none" strike="noStrike" cap="none" dirty="0">
+              <a:rPr lang="en-US" sz="1200" b="0" i="0" u="none" strike="noStrike" cap="none" dirty="0">
                 <a:solidFill>
                   <a:srgbClr val="000000"/>
                 </a:solidFill>
@@ -5595,7 +5578,7 @@
               </a:rPr>
               <a:t>Mentor.</a:t>
             </a:r>
-            <a:endParaRPr sz="1100" b="0" i="0" u="none" strike="noStrike" cap="none" dirty="0">
+            <a:endParaRPr sz="1200" b="0" i="0" u="none" strike="noStrike" cap="none" dirty="0">
               <a:solidFill>
                 <a:srgbClr val="000000"/>
               </a:solidFill>
@@ -5637,7 +5620,7 @@
             </a:pPr>
             <a:r>
               <a:rPr lang="en-US" b="1" dirty="0"/>
-              <a:t>What opportunities exist to predict Social Media Sentiment, Trend Analysis, and Engagement?</a:t>
+              <a:t>What opportunities exist to predict customer Sentiment related to airline?</a:t>
             </a:r>
           </a:p>
         </p:txBody>

</xml_diff>